<commit_message>
added flight revised ERD
</commit_message>
<xml_diff>
--- a/chaluutali Documentation.pptx
+++ b/chaluutali Documentation.pptx
@@ -14,31 +14,33 @@
     <p:sldId id="260" r:id="rId8"/>
     <p:sldId id="261" r:id="rId9"/>
     <p:sldId id="262" r:id="rId10"/>
-    <p:sldId id="273" r:id="rId11"/>
-    <p:sldId id="269" r:id="rId12"/>
-    <p:sldId id="274" r:id="rId13"/>
-    <p:sldId id="275" r:id="rId14"/>
-    <p:sldId id="276" r:id="rId15"/>
-    <p:sldId id="277" r:id="rId16"/>
-    <p:sldId id="279" r:id="rId17"/>
-    <p:sldId id="280" r:id="rId18"/>
-    <p:sldId id="281" r:id="rId19"/>
-    <p:sldId id="282" r:id="rId20"/>
-    <p:sldId id="283" r:id="rId21"/>
-    <p:sldId id="284" r:id="rId22"/>
-    <p:sldId id="285" r:id="rId23"/>
-    <p:sldId id="286" r:id="rId24"/>
-    <p:sldId id="287" r:id="rId25"/>
-    <p:sldId id="288" r:id="rId26"/>
-    <p:sldId id="289" r:id="rId27"/>
-    <p:sldId id="290" r:id="rId28"/>
-    <p:sldId id="291" r:id="rId29"/>
-    <p:sldId id="292" r:id="rId30"/>
-    <p:sldId id="293" r:id="rId31"/>
-    <p:sldId id="294" r:id="rId32"/>
-    <p:sldId id="295" r:id="rId33"/>
-    <p:sldId id="296" r:id="rId34"/>
-    <p:sldId id="304" r:id="rId35"/>
+    <p:sldId id="305" r:id="rId11"/>
+    <p:sldId id="306" r:id="rId12"/>
+    <p:sldId id="273" r:id="rId13"/>
+    <p:sldId id="269" r:id="rId14"/>
+    <p:sldId id="274" r:id="rId15"/>
+    <p:sldId id="275" r:id="rId16"/>
+    <p:sldId id="276" r:id="rId17"/>
+    <p:sldId id="277" r:id="rId18"/>
+    <p:sldId id="279" r:id="rId19"/>
+    <p:sldId id="280" r:id="rId20"/>
+    <p:sldId id="281" r:id="rId21"/>
+    <p:sldId id="282" r:id="rId22"/>
+    <p:sldId id="283" r:id="rId23"/>
+    <p:sldId id="284" r:id="rId24"/>
+    <p:sldId id="285" r:id="rId25"/>
+    <p:sldId id="286" r:id="rId26"/>
+    <p:sldId id="287" r:id="rId27"/>
+    <p:sldId id="288" r:id="rId28"/>
+    <p:sldId id="289" r:id="rId29"/>
+    <p:sldId id="290" r:id="rId30"/>
+    <p:sldId id="291" r:id="rId31"/>
+    <p:sldId id="292" r:id="rId32"/>
+    <p:sldId id="293" r:id="rId33"/>
+    <p:sldId id="294" r:id="rId34"/>
+    <p:sldId id="295" r:id="rId35"/>
+    <p:sldId id="296" r:id="rId36"/>
+    <p:sldId id="304" r:id="rId37"/>
   </p:sldIdLst>
   <p:sldSz cx="9144000" cy="6858000" type="screen4x3"/>
   <p:notesSz cx="6858000" cy="9144000"/>
@@ -322,7 +324,7 @@
             <a:fld id="{1D8BD707-D9CF-40AE-B4C6-C98DA3205C09}" type="datetimeFigureOut">
               <a:rPr lang="en-US" smtClean="0"/>
               <a:pPr/>
-              <a:t>5/31/2018</a:t>
+              <a:t>6/4/2018</a:t>
             </a:fld>
             <a:endParaRPr lang="en-US"/>
           </a:p>
@@ -494,7 +496,7 @@
             <a:fld id="{1D8BD707-D9CF-40AE-B4C6-C98DA3205C09}" type="datetimeFigureOut">
               <a:rPr lang="en-US" smtClean="0"/>
               <a:pPr/>
-              <a:t>5/31/2018</a:t>
+              <a:t>6/4/2018</a:t>
             </a:fld>
             <a:endParaRPr lang="en-US"/>
           </a:p>
@@ -676,7 +678,7 @@
             <a:fld id="{1D8BD707-D9CF-40AE-B4C6-C98DA3205C09}" type="datetimeFigureOut">
               <a:rPr lang="en-US" smtClean="0"/>
               <a:pPr/>
-              <a:t>5/31/2018</a:t>
+              <a:t>6/4/2018</a:t>
             </a:fld>
             <a:endParaRPr lang="en-US"/>
           </a:p>
@@ -848,7 +850,7 @@
             <a:fld id="{1D8BD707-D9CF-40AE-B4C6-C98DA3205C09}" type="datetimeFigureOut">
               <a:rPr lang="en-US" smtClean="0"/>
               <a:pPr/>
-              <a:t>5/31/2018</a:t>
+              <a:t>6/4/2018</a:t>
             </a:fld>
             <a:endParaRPr lang="en-US"/>
           </a:p>
@@ -1096,7 +1098,7 @@
             <a:fld id="{1D8BD707-D9CF-40AE-B4C6-C98DA3205C09}" type="datetimeFigureOut">
               <a:rPr lang="en-US" smtClean="0"/>
               <a:pPr/>
-              <a:t>5/31/2018</a:t>
+              <a:t>6/4/2018</a:t>
             </a:fld>
             <a:endParaRPr lang="en-US"/>
           </a:p>
@@ -1386,7 +1388,7 @@
             <a:fld id="{1D8BD707-D9CF-40AE-B4C6-C98DA3205C09}" type="datetimeFigureOut">
               <a:rPr lang="en-US" smtClean="0"/>
               <a:pPr/>
-              <a:t>5/31/2018</a:t>
+              <a:t>6/4/2018</a:t>
             </a:fld>
             <a:endParaRPr lang="en-US"/>
           </a:p>
@@ -1810,7 +1812,7 @@
             <a:fld id="{1D8BD707-D9CF-40AE-B4C6-C98DA3205C09}" type="datetimeFigureOut">
               <a:rPr lang="en-US" smtClean="0"/>
               <a:pPr/>
-              <a:t>5/31/2018</a:t>
+              <a:t>6/4/2018</a:t>
             </a:fld>
             <a:endParaRPr lang="en-US"/>
           </a:p>
@@ -1930,7 +1932,7 @@
             <a:fld id="{1D8BD707-D9CF-40AE-B4C6-C98DA3205C09}" type="datetimeFigureOut">
               <a:rPr lang="en-US" smtClean="0"/>
               <a:pPr/>
-              <a:t>5/31/2018</a:t>
+              <a:t>6/4/2018</a:t>
             </a:fld>
             <a:endParaRPr lang="en-US"/>
           </a:p>
@@ -2027,7 +2029,7 @@
             <a:fld id="{1D8BD707-D9CF-40AE-B4C6-C98DA3205C09}" type="datetimeFigureOut">
               <a:rPr lang="en-US" smtClean="0"/>
               <a:pPr/>
-              <a:t>5/31/2018</a:t>
+              <a:t>6/4/2018</a:t>
             </a:fld>
             <a:endParaRPr lang="en-US"/>
           </a:p>
@@ -2306,7 +2308,7 @@
             <a:fld id="{1D8BD707-D9CF-40AE-B4C6-C98DA3205C09}" type="datetimeFigureOut">
               <a:rPr lang="en-US" smtClean="0"/>
               <a:pPr/>
-              <a:t>5/31/2018</a:t>
+              <a:t>6/4/2018</a:t>
             </a:fld>
             <a:endParaRPr lang="en-US"/>
           </a:p>
@@ -2561,7 +2563,7 @@
             <a:fld id="{1D8BD707-D9CF-40AE-B4C6-C98DA3205C09}" type="datetimeFigureOut">
               <a:rPr lang="en-US" smtClean="0"/>
               <a:pPr/>
-              <a:t>5/31/2018</a:t>
+              <a:t>6/4/2018</a:t>
             </a:fld>
             <a:endParaRPr lang="en-US"/>
           </a:p>
@@ -2776,7 +2778,7 @@
             <a:fld id="{1D8BD707-D9CF-40AE-B4C6-C98DA3205C09}" type="datetimeFigureOut">
               <a:rPr lang="en-US" smtClean="0"/>
               <a:pPr/>
-              <a:t>5/31/2018</a:t>
+              <a:t>6/4/2018</a:t>
             </a:fld>
             <a:endParaRPr lang="en-US"/>
           </a:p>
@@ -3207,11 +3209,7 @@
           <a:p>
             <a:r>
               <a:rPr lang="en-ZA" dirty="0" smtClean="0"/>
-              <a:t>Redesign and implement a user friendly Flight, Car Hire, Hotel &amp; Holiday booking Application with advanced functionality and easy</a:t>
-            </a:r>
-            <a:r>
-              <a:rPr lang="en-ZA" dirty="0" smtClean="0"/>
-              <a:t> </a:t>
+              <a:t>Redesign and implement a user friendly Flight, Car Hire, Hotel &amp; Holiday booking Application with advanced functionality and easy </a:t>
             </a:r>
             <a:r>
               <a:rPr lang="en-ZA" dirty="0"/>
@@ -3237,6 +3235,216 @@
 </file>
 
 <file path=ppt/slides/slide10.xml><?xml version="1.0" encoding="utf-8"?>
+<p:sld xmlns:a="http://schemas.openxmlformats.org/drawingml/2006/main" xmlns:r="http://schemas.openxmlformats.org/officeDocument/2006/relationships" xmlns:p="http://schemas.openxmlformats.org/presentationml/2006/main">
+  <p:cSld>
+    <p:spTree>
+      <p:nvGrpSpPr>
+        <p:cNvPr id="1" name=""/>
+        <p:cNvGrpSpPr/>
+        <p:nvPr/>
+      </p:nvGrpSpPr>
+      <p:grpSpPr>
+        <a:xfrm>
+          <a:off x="0" y="0"/>
+          <a:ext cx="0" cy="0"/>
+          <a:chOff x="0" y="0"/>
+          <a:chExt cx="0" cy="0"/>
+        </a:xfrm>
+      </p:grpSpPr>
+      <p:sp>
+        <p:nvSpPr>
+          <p:cNvPr id="2" name="Title 1"/>
+          <p:cNvSpPr>
+            <a:spLocks noGrp="1"/>
+          </p:cNvSpPr>
+          <p:nvPr>
+            <p:ph type="title"/>
+          </p:nvPr>
+        </p:nvSpPr>
+        <p:spPr/>
+        <p:txBody>
+          <a:bodyPr/>
+          <a:lstStyle/>
+          <a:p>
+            <a:r>
+              <a:rPr lang="en-GB" dirty="0" smtClean="0"/>
+              <a:t>FLIGHTS ERD DIAGRAM</a:t>
+            </a:r>
+            <a:endParaRPr lang="en-ZA" dirty="0"/>
+          </a:p>
+        </p:txBody>
+      </p:sp>
+      <p:pic>
+        <p:nvPicPr>
+          <p:cNvPr id="1026" name="Picture 2"/>
+          <p:cNvPicPr>
+            <a:picLocks noChangeAspect="1" noChangeArrowheads="1"/>
+          </p:cNvPicPr>
+          <p:nvPr/>
+        </p:nvPicPr>
+        <p:blipFill>
+          <a:blip r:embed="rId2">
+            <a:extLst>
+              <a:ext uri="{28A0092B-C50C-407E-A947-70E740481C1C}">
+                <a14:useLocalDpi xmlns:a14="http://schemas.microsoft.com/office/drawing/2010/main" val="0"/>
+              </a:ext>
+            </a:extLst>
+          </a:blip>
+          <a:srcRect/>
+          <a:stretch>
+            <a:fillRect/>
+          </a:stretch>
+        </p:blipFill>
+        <p:spPr bwMode="auto">
+          <a:xfrm>
+            <a:off x="-130628" y="1143000"/>
+            <a:ext cx="9448800" cy="6743700"/>
+          </a:xfrm>
+          <a:prstGeom prst="rect">
+            <a:avLst/>
+          </a:prstGeom>
+          <a:noFill/>
+          <a:ln>
+            <a:noFill/>
+          </a:ln>
+          <a:extLst>
+            <a:ext uri="{909E8E84-426E-40DD-AFC4-6F175D3DCCD1}">
+              <a14:hiddenFill xmlns:a14="http://schemas.microsoft.com/office/drawing/2010/main">
+                <a:solidFill>
+                  <a:schemeClr val="accent1"/>
+                </a:solidFill>
+              </a14:hiddenFill>
+            </a:ext>
+            <a:ext uri="{91240B29-F687-4F45-9708-019B960494DF}">
+              <a14:hiddenLine xmlns:a14="http://schemas.microsoft.com/office/drawing/2010/main" w="9525">
+                <a:solidFill>
+                  <a:schemeClr val="tx1"/>
+                </a:solidFill>
+                <a:miter lim="800000"/>
+                <a:headEnd/>
+                <a:tailEnd/>
+              </a14:hiddenLine>
+            </a:ext>
+          </a:extLst>
+        </p:spPr>
+      </p:pic>
+    </p:spTree>
+    <p:extLst>
+      <p:ext uri="{BB962C8B-B14F-4D97-AF65-F5344CB8AC3E}">
+        <p14:creationId xmlns:p14="http://schemas.microsoft.com/office/powerpoint/2010/main" val="1198244661"/>
+      </p:ext>
+    </p:extLst>
+  </p:cSld>
+  <p:clrMapOvr>
+    <a:masterClrMapping/>
+  </p:clrMapOvr>
+</p:sld>
+</file>
+
+<file path=ppt/slides/slide11.xml><?xml version="1.0" encoding="utf-8"?>
+<p:sld xmlns:a="http://schemas.openxmlformats.org/drawingml/2006/main" xmlns:r="http://schemas.openxmlformats.org/officeDocument/2006/relationships" xmlns:p="http://schemas.openxmlformats.org/presentationml/2006/main">
+  <p:cSld>
+    <p:spTree>
+      <p:nvGrpSpPr>
+        <p:cNvPr id="1" name=""/>
+        <p:cNvGrpSpPr/>
+        <p:nvPr/>
+      </p:nvGrpSpPr>
+      <p:grpSpPr>
+        <a:xfrm>
+          <a:off x="0" y="0"/>
+          <a:ext cx="0" cy="0"/>
+          <a:chOff x="0" y="0"/>
+          <a:chExt cx="0" cy="0"/>
+        </a:xfrm>
+      </p:grpSpPr>
+      <p:sp>
+        <p:nvSpPr>
+          <p:cNvPr id="2" name="Title 1"/>
+          <p:cNvSpPr>
+            <a:spLocks noGrp="1"/>
+          </p:cNvSpPr>
+          <p:nvPr>
+            <p:ph type="title"/>
+          </p:nvPr>
+        </p:nvSpPr>
+        <p:spPr/>
+        <p:txBody>
+          <a:bodyPr/>
+          <a:lstStyle/>
+          <a:p>
+            <a:endParaRPr lang="en-ZA"/>
+          </a:p>
+        </p:txBody>
+      </p:sp>
+      <p:pic>
+        <p:nvPicPr>
+          <p:cNvPr id="2050" name="Picture 2"/>
+          <p:cNvPicPr>
+            <a:picLocks noChangeAspect="1" noChangeArrowheads="1"/>
+          </p:cNvPicPr>
+          <p:nvPr/>
+        </p:nvPicPr>
+        <p:blipFill>
+          <a:blip r:embed="rId2">
+            <a:extLst>
+              <a:ext uri="{28A0092B-C50C-407E-A947-70E740481C1C}">
+                <a14:useLocalDpi xmlns:a14="http://schemas.microsoft.com/office/drawing/2010/main" val="0"/>
+              </a:ext>
+            </a:extLst>
+          </a:blip>
+          <a:srcRect/>
+          <a:stretch>
+            <a:fillRect/>
+          </a:stretch>
+        </p:blipFill>
+        <p:spPr bwMode="auto">
+          <a:xfrm>
+            <a:off x="0" y="47625"/>
+            <a:ext cx="9458325" cy="6762750"/>
+          </a:xfrm>
+          <a:prstGeom prst="rect">
+            <a:avLst/>
+          </a:prstGeom>
+          <a:noFill/>
+          <a:ln>
+            <a:noFill/>
+          </a:ln>
+          <a:extLst>
+            <a:ext uri="{909E8E84-426E-40DD-AFC4-6F175D3DCCD1}">
+              <a14:hiddenFill xmlns:a14="http://schemas.microsoft.com/office/drawing/2010/main">
+                <a:solidFill>
+                  <a:schemeClr val="accent1"/>
+                </a:solidFill>
+              </a14:hiddenFill>
+            </a:ext>
+            <a:ext uri="{91240B29-F687-4F45-9708-019B960494DF}">
+              <a14:hiddenLine xmlns:a14="http://schemas.microsoft.com/office/drawing/2010/main" w="9525">
+                <a:solidFill>
+                  <a:schemeClr val="tx1"/>
+                </a:solidFill>
+                <a:miter lim="800000"/>
+                <a:headEnd/>
+                <a:tailEnd/>
+              </a14:hiddenLine>
+            </a:ext>
+          </a:extLst>
+        </p:spPr>
+      </p:pic>
+    </p:spTree>
+    <p:extLst>
+      <p:ext uri="{BB962C8B-B14F-4D97-AF65-F5344CB8AC3E}">
+        <p14:creationId xmlns:p14="http://schemas.microsoft.com/office/powerpoint/2010/main" val="3975227108"/>
+      </p:ext>
+    </p:extLst>
+  </p:cSld>
+  <p:clrMapOvr>
+    <a:masterClrMapping/>
+  </p:clrMapOvr>
+</p:sld>
+</file>
+
+<file path=ppt/slides/slide12.xml><?xml version="1.0" encoding="utf-8"?>
 <p:sld xmlns:a="http://schemas.openxmlformats.org/drawingml/2006/main" xmlns:r="http://schemas.openxmlformats.org/officeDocument/2006/relationships" xmlns:p="http://schemas.openxmlformats.org/presentationml/2006/main">
   <p:cSld>
     <p:spTree>
@@ -3360,7 +3568,7 @@
 </p:sld>
 </file>
 
-<file path=ppt/slides/slide11.xml><?xml version="1.0" encoding="utf-8"?>
+<file path=ppt/slides/slide13.xml><?xml version="1.0" encoding="utf-8"?>
 <p:sld xmlns:a="http://schemas.openxmlformats.org/drawingml/2006/main" xmlns:r="http://schemas.openxmlformats.org/officeDocument/2006/relationships" xmlns:p="http://schemas.openxmlformats.org/presentationml/2006/main">
   <p:cSld>
     <p:spTree>
@@ -3454,7 +3662,7 @@
 </p:sld>
 </file>
 
-<file path=ppt/slides/slide12.xml><?xml version="1.0" encoding="utf-8"?>
+<file path=ppt/slides/slide14.xml><?xml version="1.0" encoding="utf-8"?>
 <p:sld xmlns:a="http://schemas.openxmlformats.org/drawingml/2006/main" xmlns:r="http://schemas.openxmlformats.org/officeDocument/2006/relationships" xmlns:p="http://schemas.openxmlformats.org/presentationml/2006/main">
   <p:cSld>
     <p:spTree>
@@ -3548,7 +3756,7 @@
 </p:sld>
 </file>
 
-<file path=ppt/slides/slide13.xml><?xml version="1.0" encoding="utf-8"?>
+<file path=ppt/slides/slide15.xml><?xml version="1.0" encoding="utf-8"?>
 <p:sld xmlns:a="http://schemas.openxmlformats.org/drawingml/2006/main" xmlns:r="http://schemas.openxmlformats.org/officeDocument/2006/relationships" xmlns:p="http://schemas.openxmlformats.org/presentationml/2006/main">
   <p:cSld>
     <p:spTree>
@@ -3642,7 +3850,7 @@
 </p:sld>
 </file>
 
-<file path=ppt/slides/slide14.xml><?xml version="1.0" encoding="utf-8"?>
+<file path=ppt/slides/slide16.xml><?xml version="1.0" encoding="utf-8"?>
 <p:sld xmlns:a="http://schemas.openxmlformats.org/drawingml/2006/main" xmlns:r="http://schemas.openxmlformats.org/officeDocument/2006/relationships" xmlns:p="http://schemas.openxmlformats.org/presentationml/2006/main">
   <p:cSld>
     <p:spTree>
@@ -3736,7 +3944,7 @@
 </p:sld>
 </file>
 
-<file path=ppt/slides/slide15.xml><?xml version="1.0" encoding="utf-8"?>
+<file path=ppt/slides/slide17.xml><?xml version="1.0" encoding="utf-8"?>
 <p:sld xmlns:a="http://schemas.openxmlformats.org/drawingml/2006/main" xmlns:r="http://schemas.openxmlformats.org/officeDocument/2006/relationships" xmlns:p="http://schemas.openxmlformats.org/presentationml/2006/main">
   <p:cSld>
     <p:spTree>
@@ -3830,7 +4038,7 @@
 </p:sld>
 </file>
 
-<file path=ppt/slides/slide16.xml><?xml version="1.0" encoding="utf-8"?>
+<file path=ppt/slides/slide18.xml><?xml version="1.0" encoding="utf-8"?>
 <p:sld xmlns:a="http://schemas.openxmlformats.org/drawingml/2006/main" xmlns:r="http://schemas.openxmlformats.org/officeDocument/2006/relationships" xmlns:p="http://schemas.openxmlformats.org/presentationml/2006/main">
   <p:cSld>
     <p:spTree>
@@ -3924,7 +4132,7 @@
 </p:sld>
 </file>
 
-<file path=ppt/slides/slide17.xml><?xml version="1.0" encoding="utf-8"?>
+<file path=ppt/slides/slide19.xml><?xml version="1.0" encoding="utf-8"?>
 <p:sld xmlns:a="http://schemas.openxmlformats.org/drawingml/2006/main" xmlns:r="http://schemas.openxmlformats.org/officeDocument/2006/relationships" xmlns:p="http://schemas.openxmlformats.org/presentationml/2006/main">
   <p:cSld>
     <p:spTree>
@@ -4018,7 +4226,109 @@
 </p:sld>
 </file>
 
-<file path=ppt/slides/slide18.xml><?xml version="1.0" encoding="utf-8"?>
+<file path=ppt/slides/slide2.xml><?xml version="1.0" encoding="utf-8"?>
+<p:sld xmlns:a="http://schemas.openxmlformats.org/drawingml/2006/main" xmlns:r="http://schemas.openxmlformats.org/officeDocument/2006/relationships" xmlns:p="http://schemas.openxmlformats.org/presentationml/2006/main">
+  <p:cSld>
+    <p:spTree>
+      <p:nvGrpSpPr>
+        <p:cNvPr id="1" name=""/>
+        <p:cNvGrpSpPr/>
+        <p:nvPr/>
+      </p:nvGrpSpPr>
+      <p:grpSpPr>
+        <a:xfrm>
+          <a:off x="0" y="0"/>
+          <a:ext cx="0" cy="0"/>
+          <a:chOff x="0" y="0"/>
+          <a:chExt cx="0" cy="0"/>
+        </a:xfrm>
+      </p:grpSpPr>
+      <p:sp>
+        <p:nvSpPr>
+          <p:cNvPr id="2" name="Title 1"/>
+          <p:cNvSpPr>
+            <a:spLocks noGrp="1"/>
+          </p:cNvSpPr>
+          <p:nvPr>
+            <p:ph type="title"/>
+          </p:nvPr>
+        </p:nvSpPr>
+        <p:spPr>
+          <a:xfrm>
+            <a:off x="1828800" y="609600"/>
+            <a:ext cx="6858001" cy="838200"/>
+          </a:xfrm>
+        </p:spPr>
+        <p:txBody>
+          <a:bodyPr/>
+          <a:lstStyle/>
+          <a:p>
+            <a:r>
+              <a:rPr lang="en-ZA" dirty="0" smtClean="0"/>
+              <a:t>Project Overview</a:t>
+            </a:r>
+            <a:endParaRPr lang="en-ZA" dirty="0"/>
+          </a:p>
+        </p:txBody>
+      </p:sp>
+      <p:sp>
+        <p:nvSpPr>
+          <p:cNvPr id="3" name="Text Placeholder 2"/>
+          <p:cNvSpPr>
+            <a:spLocks noGrp="1"/>
+          </p:cNvSpPr>
+          <p:nvPr>
+            <p:ph type="body" idx="1"/>
+          </p:nvPr>
+        </p:nvSpPr>
+        <p:spPr>
+          <a:xfrm>
+            <a:off x="990600" y="1295400"/>
+            <a:ext cx="6629400" cy="3200400"/>
+          </a:xfrm>
+        </p:spPr>
+        <p:txBody>
+          <a:bodyPr/>
+          <a:lstStyle/>
+          <a:p>
+            <a:r>
+              <a:rPr lang="en-ZA" dirty="0" smtClean="0"/>
+              <a:t>The main purpose of this project is to design an </a:t>
+            </a:r>
+            <a:r>
+              <a:rPr lang="en-ZA" dirty="0" err="1" smtClean="0"/>
+              <a:t>onlline</a:t>
+            </a:r>
+            <a:r>
+              <a:rPr lang="en-ZA" dirty="0" smtClean="0"/>
+              <a:t> e-commerce system for like </a:t>
+            </a:r>
+            <a:r>
+              <a:rPr lang="en-ZA" dirty="0" err="1" smtClean="0"/>
+              <a:t>Kulula</a:t>
+            </a:r>
+            <a:r>
+              <a:rPr lang="en-ZA" dirty="0" smtClean="0"/>
+              <a:t> airlines. The system should allow the customer to search flights, search car hires, search for hotels as well as book and manage  a ticket based on their needs. The system will include the eight features of e-commerce ,namely: ubiquity, global reach, universal standards, richness, interactivity, information density, personalisation and lastly social technology. The system will be user-friendly.   </a:t>
+            </a:r>
+            <a:endParaRPr lang="en-ZA" dirty="0"/>
+          </a:p>
+        </p:txBody>
+      </p:sp>
+    </p:spTree>
+    <p:extLst>
+      <p:ext uri="{BB962C8B-B14F-4D97-AF65-F5344CB8AC3E}">
+        <p14:creationId xmlns:p14="http://schemas.microsoft.com/office/powerpoint/2010/main" val="371329199"/>
+      </p:ext>
+    </p:extLst>
+  </p:cSld>
+  <p:clrMapOvr>
+    <a:masterClrMapping/>
+  </p:clrMapOvr>
+</p:sld>
+</file>
+
+<file path=ppt/slides/slide20.xml><?xml version="1.0" encoding="utf-8"?>
 <p:sld xmlns:a="http://schemas.openxmlformats.org/drawingml/2006/main" xmlns:r="http://schemas.openxmlformats.org/officeDocument/2006/relationships" xmlns:p="http://schemas.openxmlformats.org/presentationml/2006/main">
   <p:cSld>
     <p:spTree>
@@ -4112,7 +4422,7 @@
 </p:sld>
 </file>
 
-<file path=ppt/slides/slide19.xml><?xml version="1.0" encoding="utf-8"?>
+<file path=ppt/slides/slide21.xml><?xml version="1.0" encoding="utf-8"?>
 <p:sld xmlns:a="http://schemas.openxmlformats.org/drawingml/2006/main" xmlns:r="http://schemas.openxmlformats.org/officeDocument/2006/relationships" xmlns:p="http://schemas.openxmlformats.org/presentationml/2006/main">
   <p:cSld>
     <p:spTree>
@@ -4206,129 +4516,7 @@
 </p:sld>
 </file>
 
-<file path=ppt/slides/slide2.xml><?xml version="1.0" encoding="utf-8"?>
-<p:sld xmlns:a="http://schemas.openxmlformats.org/drawingml/2006/main" xmlns:r="http://schemas.openxmlformats.org/officeDocument/2006/relationships" xmlns:p="http://schemas.openxmlformats.org/presentationml/2006/main">
-  <p:cSld>
-    <p:spTree>
-      <p:nvGrpSpPr>
-        <p:cNvPr id="1" name=""/>
-        <p:cNvGrpSpPr/>
-        <p:nvPr/>
-      </p:nvGrpSpPr>
-      <p:grpSpPr>
-        <a:xfrm>
-          <a:off x="0" y="0"/>
-          <a:ext cx="0" cy="0"/>
-          <a:chOff x="0" y="0"/>
-          <a:chExt cx="0" cy="0"/>
-        </a:xfrm>
-      </p:grpSpPr>
-      <p:sp>
-        <p:nvSpPr>
-          <p:cNvPr id="2" name="Title 1"/>
-          <p:cNvSpPr>
-            <a:spLocks noGrp="1"/>
-          </p:cNvSpPr>
-          <p:nvPr>
-            <p:ph type="title"/>
-          </p:nvPr>
-        </p:nvSpPr>
-        <p:spPr>
-          <a:xfrm>
-            <a:off x="1828800" y="609600"/>
-            <a:ext cx="6858001" cy="838200"/>
-          </a:xfrm>
-        </p:spPr>
-        <p:txBody>
-          <a:bodyPr/>
-          <a:lstStyle/>
-          <a:p>
-            <a:r>
-              <a:rPr lang="en-ZA" dirty="0" smtClean="0"/>
-              <a:t>Project Overview</a:t>
-            </a:r>
-            <a:endParaRPr lang="en-ZA" dirty="0"/>
-          </a:p>
-        </p:txBody>
-      </p:sp>
-      <p:sp>
-        <p:nvSpPr>
-          <p:cNvPr id="3" name="Text Placeholder 2"/>
-          <p:cNvSpPr>
-            <a:spLocks noGrp="1"/>
-          </p:cNvSpPr>
-          <p:nvPr>
-            <p:ph type="body" idx="1"/>
-          </p:nvPr>
-        </p:nvSpPr>
-        <p:spPr>
-          <a:xfrm>
-            <a:off x="990600" y="1295400"/>
-            <a:ext cx="6629400" cy="3200400"/>
-          </a:xfrm>
-        </p:spPr>
-        <p:txBody>
-          <a:bodyPr/>
-          <a:lstStyle/>
-          <a:p>
-            <a:r>
-              <a:rPr lang="en-ZA" dirty="0" smtClean="0"/>
-              <a:t>The </a:t>
-            </a:r>
-            <a:r>
-              <a:rPr lang="en-ZA" dirty="0" smtClean="0"/>
-              <a:t>main purpose</a:t>
-            </a:r>
-            <a:r>
-              <a:rPr lang="en-ZA" dirty="0" smtClean="0"/>
-              <a:t> </a:t>
-            </a:r>
-            <a:r>
-              <a:rPr lang="en-ZA" dirty="0" smtClean="0"/>
-              <a:t>of this project is to design an </a:t>
-            </a:r>
-            <a:r>
-              <a:rPr lang="en-ZA" dirty="0" err="1" smtClean="0"/>
-              <a:t>onlline</a:t>
-            </a:r>
-            <a:r>
-              <a:rPr lang="en-ZA" dirty="0" smtClean="0"/>
-              <a:t> e-commerce system for </a:t>
-            </a:r>
-            <a:r>
-              <a:rPr lang="en-ZA" dirty="0" smtClean="0"/>
-              <a:t>like </a:t>
-            </a:r>
-            <a:r>
-              <a:rPr lang="en-ZA" dirty="0" err="1" smtClean="0"/>
-              <a:t>Kulula</a:t>
-            </a:r>
-            <a:r>
-              <a:rPr lang="en-ZA" dirty="0" smtClean="0"/>
-              <a:t> </a:t>
-            </a:r>
-            <a:r>
-              <a:rPr lang="en-ZA" dirty="0" smtClean="0"/>
-              <a:t>airlines. The system should allow the customer to search flights, search car hires, search for hotels as well as book and manage  a ticket based on their needs. The system will include the eight features of e-commerce ,namely: ubiquity, global reach, universal standards, richness, interactivity, information density, personalisation and lastly social technology. The system will be user-friendly.   </a:t>
-            </a:r>
-            <a:endParaRPr lang="en-ZA" dirty="0"/>
-          </a:p>
-        </p:txBody>
-      </p:sp>
-    </p:spTree>
-    <p:extLst>
-      <p:ext uri="{BB962C8B-B14F-4D97-AF65-F5344CB8AC3E}">
-        <p14:creationId xmlns:p14="http://schemas.microsoft.com/office/powerpoint/2010/main" val="371329199"/>
-      </p:ext>
-    </p:extLst>
-  </p:cSld>
-  <p:clrMapOvr>
-    <a:masterClrMapping/>
-  </p:clrMapOvr>
-</p:sld>
-</file>
-
-<file path=ppt/slides/slide20.xml><?xml version="1.0" encoding="utf-8"?>
+<file path=ppt/slides/slide22.xml><?xml version="1.0" encoding="utf-8"?>
 <p:sld xmlns:a="http://schemas.openxmlformats.org/drawingml/2006/main" xmlns:r="http://schemas.openxmlformats.org/officeDocument/2006/relationships" xmlns:p="http://schemas.openxmlformats.org/presentationml/2006/main">
   <p:cSld>
     <p:spTree>
@@ -4422,7 +4610,7 @@
 </p:sld>
 </file>
 
-<file path=ppt/slides/slide21.xml><?xml version="1.0" encoding="utf-8"?>
+<file path=ppt/slides/slide23.xml><?xml version="1.0" encoding="utf-8"?>
 <p:sld xmlns:a="http://schemas.openxmlformats.org/drawingml/2006/main" xmlns:r="http://schemas.openxmlformats.org/officeDocument/2006/relationships" xmlns:p="http://schemas.openxmlformats.org/presentationml/2006/main">
   <p:cSld>
     <p:spTree>
@@ -4516,7 +4704,7 @@
 </p:sld>
 </file>
 
-<file path=ppt/slides/slide22.xml><?xml version="1.0" encoding="utf-8"?>
+<file path=ppt/slides/slide24.xml><?xml version="1.0" encoding="utf-8"?>
 <p:sld xmlns:a="http://schemas.openxmlformats.org/drawingml/2006/main" xmlns:r="http://schemas.openxmlformats.org/officeDocument/2006/relationships" xmlns:p="http://schemas.openxmlformats.org/presentationml/2006/main">
   <p:cSld>
     <p:spTree>
@@ -4610,7 +4798,7 @@
 </p:sld>
 </file>
 
-<file path=ppt/slides/slide23.xml><?xml version="1.0" encoding="utf-8"?>
+<file path=ppt/slides/slide25.xml><?xml version="1.0" encoding="utf-8"?>
 <p:sld xmlns:a="http://schemas.openxmlformats.org/drawingml/2006/main" xmlns:r="http://schemas.openxmlformats.org/officeDocument/2006/relationships" xmlns:p="http://schemas.openxmlformats.org/presentationml/2006/main">
   <p:cSld>
     <p:spTree>
@@ -4704,7 +4892,7 @@
 </p:sld>
 </file>
 
-<file path=ppt/slides/slide24.xml><?xml version="1.0" encoding="utf-8"?>
+<file path=ppt/slides/slide26.xml><?xml version="1.0" encoding="utf-8"?>
 <p:sld xmlns:a="http://schemas.openxmlformats.org/drawingml/2006/main" xmlns:r="http://schemas.openxmlformats.org/officeDocument/2006/relationships" xmlns:p="http://schemas.openxmlformats.org/presentationml/2006/main">
   <p:cSld>
     <p:spTree>
@@ -4798,7 +4986,7 @@
 </p:sld>
 </file>
 
-<file path=ppt/slides/slide25.xml><?xml version="1.0" encoding="utf-8"?>
+<file path=ppt/slides/slide27.xml><?xml version="1.0" encoding="utf-8"?>
 <p:sld xmlns:a="http://schemas.openxmlformats.org/drawingml/2006/main" xmlns:r="http://schemas.openxmlformats.org/officeDocument/2006/relationships" xmlns:p="http://schemas.openxmlformats.org/presentationml/2006/main">
   <p:cSld>
     <p:spTree>
@@ -4892,7 +5080,7 @@
 </p:sld>
 </file>
 
-<file path=ppt/slides/slide26.xml><?xml version="1.0" encoding="utf-8"?>
+<file path=ppt/slides/slide28.xml><?xml version="1.0" encoding="utf-8"?>
 <p:sld xmlns:a="http://schemas.openxmlformats.org/drawingml/2006/main" xmlns:r="http://schemas.openxmlformats.org/officeDocument/2006/relationships" xmlns:p="http://schemas.openxmlformats.org/presentationml/2006/main">
   <p:cSld>
     <p:spTree>
@@ -4986,7 +5174,7 @@
 </p:sld>
 </file>
 
-<file path=ppt/slides/slide27.xml><?xml version="1.0" encoding="utf-8"?>
+<file path=ppt/slides/slide29.xml><?xml version="1.0" encoding="utf-8"?>
 <p:sld xmlns:a="http://schemas.openxmlformats.org/drawingml/2006/main" xmlns:r="http://schemas.openxmlformats.org/officeDocument/2006/relationships" xmlns:p="http://schemas.openxmlformats.org/presentationml/2006/main">
   <p:cSld>
     <p:spTree>
@@ -5080,7 +5268,176 @@
 </p:sld>
 </file>
 
-<file path=ppt/slides/slide28.xml><?xml version="1.0" encoding="utf-8"?>
+<file path=ppt/slides/slide3.xml><?xml version="1.0" encoding="utf-8"?>
+<p:sld xmlns:a="http://schemas.openxmlformats.org/drawingml/2006/main" xmlns:r="http://schemas.openxmlformats.org/officeDocument/2006/relationships" xmlns:p="http://schemas.openxmlformats.org/presentationml/2006/main">
+  <p:cSld>
+    <p:spTree>
+      <p:nvGrpSpPr>
+        <p:cNvPr id="1" name=""/>
+        <p:cNvGrpSpPr/>
+        <p:nvPr/>
+      </p:nvGrpSpPr>
+      <p:grpSpPr>
+        <a:xfrm>
+          <a:off x="0" y="0"/>
+          <a:ext cx="0" cy="0"/>
+          <a:chOff x="0" y="0"/>
+          <a:chExt cx="0" cy="0"/>
+        </a:xfrm>
+      </p:grpSpPr>
+      <p:sp>
+        <p:nvSpPr>
+          <p:cNvPr id="4" name="Title 3"/>
+          <p:cNvSpPr>
+            <a:spLocks noGrp="1"/>
+          </p:cNvSpPr>
+          <p:nvPr>
+            <p:ph type="title"/>
+          </p:nvPr>
+        </p:nvSpPr>
+        <p:spPr>
+          <a:xfrm>
+            <a:off x="2667000" y="457200"/>
+            <a:ext cx="7162800" cy="914400"/>
+          </a:xfrm>
+        </p:spPr>
+        <p:txBody>
+          <a:bodyPr/>
+          <a:lstStyle/>
+          <a:p>
+            <a:r>
+              <a:rPr lang="en-ZA" dirty="0" smtClean="0"/>
+              <a:t>OOP Principles Followed:</a:t>
+            </a:r>
+            <a:endParaRPr lang="en-ZA" dirty="0"/>
+          </a:p>
+        </p:txBody>
+      </p:sp>
+      <p:sp>
+        <p:nvSpPr>
+          <p:cNvPr id="3" name="Text Placeholder 2"/>
+          <p:cNvSpPr>
+            <a:spLocks noGrp="1"/>
+          </p:cNvSpPr>
+          <p:nvPr>
+            <p:ph type="body" sz="half" idx="2"/>
+          </p:nvPr>
+        </p:nvSpPr>
+        <p:spPr>
+          <a:xfrm>
+            <a:off x="1143000" y="1752600"/>
+            <a:ext cx="7162799" cy="3048000"/>
+          </a:xfrm>
+        </p:spPr>
+        <p:txBody>
+          <a:bodyPr/>
+          <a:lstStyle/>
+          <a:p>
+            <a:r>
+              <a:rPr lang="en-ZA" b="1" dirty="0" smtClean="0"/>
+              <a:t>Encapsulation:</a:t>
+            </a:r>
+            <a:r>
+              <a:rPr lang="en-ZA" dirty="0" smtClean="0"/>
+              <a:t>  the </a:t>
+            </a:r>
+            <a:r>
+              <a:rPr lang="en-ZA" dirty="0"/>
+              <a:t>internal representation of an object is generally hidden from view outside of the object’s definition</a:t>
+            </a:r>
+            <a:r>
+              <a:rPr lang="en-ZA" dirty="0" smtClean="0"/>
+              <a:t>.</a:t>
+            </a:r>
+          </a:p>
+          <a:p>
+            <a:endParaRPr lang="en-ZA" dirty="0" smtClean="0"/>
+          </a:p>
+          <a:p>
+            <a:r>
+              <a:rPr lang="en-ZA" b="1" dirty="0"/>
+              <a:t>Abstraction:</a:t>
+            </a:r>
+            <a:r>
+              <a:rPr lang="en-ZA" dirty="0"/>
+              <a:t> Hiding internal details and showing functionality is known as abstraction. Abstraction is closely tied to encapsulation and in a sense that it hides internal details of a class and only show its functionality</a:t>
+            </a:r>
+            <a:r>
+              <a:rPr lang="en-ZA" dirty="0" smtClean="0"/>
+              <a:t>.</a:t>
+            </a:r>
+          </a:p>
+          <a:p>
+            <a:endParaRPr lang="en-ZA" dirty="0" smtClean="0"/>
+          </a:p>
+          <a:p>
+            <a:r>
+              <a:rPr lang="en-ZA" b="1" dirty="0" smtClean="0"/>
+              <a:t>Inheritance</a:t>
+            </a:r>
+            <a:r>
+              <a:rPr lang="en-ZA" dirty="0" smtClean="0"/>
+              <a:t>: When </a:t>
+            </a:r>
+            <a:r>
+              <a:rPr lang="en-ZA" dirty="0"/>
+              <a:t>one object acquires all the properties and behaviours of parent </a:t>
+            </a:r>
+            <a:r>
+              <a:rPr lang="en-ZA" dirty="0" smtClean="0"/>
+              <a:t>object. </a:t>
+            </a:r>
+            <a:r>
+              <a:rPr lang="en-ZA" dirty="0"/>
+              <a:t>It provides code reusability</a:t>
+            </a:r>
+            <a:r>
+              <a:rPr lang="en-ZA" dirty="0" smtClean="0"/>
+              <a:t>.</a:t>
+            </a:r>
+          </a:p>
+          <a:p>
+            <a:endParaRPr lang="en-ZA" dirty="0" smtClean="0"/>
+          </a:p>
+          <a:p>
+            <a:r>
+              <a:rPr lang="en-ZA" b="1" dirty="0" smtClean="0"/>
+              <a:t>Polymorphism:</a:t>
+            </a:r>
+            <a:r>
+              <a:rPr lang="en-ZA" dirty="0" smtClean="0"/>
+              <a:t>  </a:t>
+            </a:r>
+            <a:r>
+              <a:rPr lang="en-ZA" dirty="0"/>
+              <a:t>one </a:t>
+            </a:r>
+            <a:r>
+              <a:rPr lang="en-ZA" dirty="0" smtClean="0"/>
+              <a:t>object have </a:t>
+            </a:r>
+            <a:r>
+              <a:rPr lang="en-ZA" dirty="0"/>
+              <a:t>many forms. Polymorphism manifests itself by having multiple methods all with the same name, but slightly different functionality.</a:t>
+            </a:r>
+            <a:endParaRPr lang="en-ZA" dirty="0" smtClean="0"/>
+          </a:p>
+        </p:txBody>
+      </p:sp>
+    </p:spTree>
+    <p:extLst>
+      <p:ext uri="{BB962C8B-B14F-4D97-AF65-F5344CB8AC3E}">
+        <p14:creationId xmlns:p14="http://schemas.microsoft.com/office/powerpoint/2010/main" val="2902649148"/>
+      </p:ext>
+    </p:extLst>
+  </p:cSld>
+  <p:clrMapOvr>
+    <a:masterClrMapping/>
+  </p:clrMapOvr>
+</p:sld>
+</file>
+
+<file path=ppt/slides/slide30.xml><?xml version="1.0" encoding="utf-8"?>
 <p:sld xmlns:a="http://schemas.openxmlformats.org/drawingml/2006/main" xmlns:r="http://schemas.openxmlformats.org/officeDocument/2006/relationships" xmlns:p="http://schemas.openxmlformats.org/presentationml/2006/main">
   <p:cSld>
     <p:spTree>
@@ -5174,7 +5531,7 @@
 </p:sld>
 </file>
 
-<file path=ppt/slides/slide29.xml><?xml version="1.0" encoding="utf-8"?>
+<file path=ppt/slides/slide31.xml><?xml version="1.0" encoding="utf-8"?>
 <p:sld xmlns:a="http://schemas.openxmlformats.org/drawingml/2006/main" xmlns:r="http://schemas.openxmlformats.org/officeDocument/2006/relationships" xmlns:p="http://schemas.openxmlformats.org/presentationml/2006/main">
   <p:cSld>
     <p:spTree>
@@ -5268,192 +5625,7 @@
 </p:sld>
 </file>
 
-<file path=ppt/slides/slide3.xml><?xml version="1.0" encoding="utf-8"?>
-<p:sld xmlns:a="http://schemas.openxmlformats.org/drawingml/2006/main" xmlns:r="http://schemas.openxmlformats.org/officeDocument/2006/relationships" xmlns:p="http://schemas.openxmlformats.org/presentationml/2006/main">
-  <p:cSld>
-    <p:spTree>
-      <p:nvGrpSpPr>
-        <p:cNvPr id="1" name=""/>
-        <p:cNvGrpSpPr/>
-        <p:nvPr/>
-      </p:nvGrpSpPr>
-      <p:grpSpPr>
-        <a:xfrm>
-          <a:off x="0" y="0"/>
-          <a:ext cx="0" cy="0"/>
-          <a:chOff x="0" y="0"/>
-          <a:chExt cx="0" cy="0"/>
-        </a:xfrm>
-      </p:grpSpPr>
-      <p:sp>
-        <p:nvSpPr>
-          <p:cNvPr id="4" name="Title 3"/>
-          <p:cNvSpPr>
-            <a:spLocks noGrp="1"/>
-          </p:cNvSpPr>
-          <p:nvPr>
-            <p:ph type="title"/>
-          </p:nvPr>
-        </p:nvSpPr>
-        <p:spPr>
-          <a:xfrm>
-            <a:off x="2667000" y="457200"/>
-            <a:ext cx="7162800" cy="914400"/>
-          </a:xfrm>
-        </p:spPr>
-        <p:txBody>
-          <a:bodyPr/>
-          <a:lstStyle/>
-          <a:p>
-            <a:r>
-              <a:rPr lang="en-ZA" dirty="0" smtClean="0"/>
-              <a:t>OOP </a:t>
-            </a:r>
-            <a:r>
-              <a:rPr lang="en-ZA" dirty="0" smtClean="0"/>
-              <a:t>Principles Followed:</a:t>
-            </a:r>
-            <a:endParaRPr lang="en-ZA" dirty="0"/>
-          </a:p>
-        </p:txBody>
-      </p:sp>
-      <p:sp>
-        <p:nvSpPr>
-          <p:cNvPr id="3" name="Text Placeholder 2"/>
-          <p:cNvSpPr>
-            <a:spLocks noGrp="1"/>
-          </p:cNvSpPr>
-          <p:nvPr>
-            <p:ph type="body" sz="half" idx="2"/>
-          </p:nvPr>
-        </p:nvSpPr>
-        <p:spPr>
-          <a:xfrm>
-            <a:off x="1143000" y="1752600"/>
-            <a:ext cx="7162799" cy="3048000"/>
-          </a:xfrm>
-        </p:spPr>
-        <p:txBody>
-          <a:bodyPr/>
-          <a:lstStyle/>
-          <a:p>
-            <a:r>
-              <a:rPr lang="en-ZA" b="1" dirty="0" smtClean="0"/>
-              <a:t>Encapsulation:</a:t>
-            </a:r>
-            <a:r>
-              <a:rPr lang="en-ZA" dirty="0" smtClean="0"/>
-              <a:t> </a:t>
-            </a:r>
-            <a:r>
-              <a:rPr lang="en-ZA" dirty="0" smtClean="0"/>
-              <a:t> </a:t>
-            </a:r>
-            <a:r>
-              <a:rPr lang="en-ZA" dirty="0" smtClean="0"/>
-              <a:t>the </a:t>
-            </a:r>
-            <a:r>
-              <a:rPr lang="en-ZA" dirty="0"/>
-              <a:t>internal representation of an object is generally hidden from view outside of the object’s definition</a:t>
-            </a:r>
-            <a:r>
-              <a:rPr lang="en-ZA" dirty="0" smtClean="0"/>
-              <a:t>.</a:t>
-            </a:r>
-          </a:p>
-          <a:p>
-            <a:endParaRPr lang="en-ZA" dirty="0" smtClean="0"/>
-          </a:p>
-          <a:p>
-            <a:r>
-              <a:rPr lang="en-ZA" b="1" dirty="0"/>
-              <a:t>Abstraction:</a:t>
-            </a:r>
-            <a:r>
-              <a:rPr lang="en-ZA" dirty="0"/>
-              <a:t> Hiding internal details and showing functionality is known as abstraction. Abstraction is closely tied to encapsulation and in a sense that it hides internal details of a class and only show its functionality</a:t>
-            </a:r>
-            <a:r>
-              <a:rPr lang="en-ZA" dirty="0" smtClean="0"/>
-              <a:t>.</a:t>
-            </a:r>
-          </a:p>
-          <a:p>
-            <a:endParaRPr lang="en-ZA" dirty="0" smtClean="0"/>
-          </a:p>
-          <a:p>
-            <a:r>
-              <a:rPr lang="en-ZA" b="1" dirty="0" smtClean="0"/>
-              <a:t>Inheritance</a:t>
-            </a:r>
-            <a:r>
-              <a:rPr lang="en-ZA" dirty="0" smtClean="0"/>
-              <a:t>: When </a:t>
-            </a:r>
-            <a:r>
-              <a:rPr lang="en-ZA" dirty="0"/>
-              <a:t>one object acquires all the properties and behaviours of parent </a:t>
-            </a:r>
-            <a:r>
-              <a:rPr lang="en-ZA" dirty="0" smtClean="0"/>
-              <a:t>object. </a:t>
-            </a:r>
-            <a:r>
-              <a:rPr lang="en-ZA" dirty="0"/>
-              <a:t>It provides code reusability</a:t>
-            </a:r>
-            <a:r>
-              <a:rPr lang="en-ZA" dirty="0" smtClean="0"/>
-              <a:t>.</a:t>
-            </a:r>
-          </a:p>
-          <a:p>
-            <a:endParaRPr lang="en-ZA" dirty="0" smtClean="0"/>
-          </a:p>
-          <a:p>
-            <a:r>
-              <a:rPr lang="en-ZA" b="1" dirty="0" smtClean="0"/>
-              <a:t>Polymorphism:</a:t>
-            </a:r>
-            <a:r>
-              <a:rPr lang="en-ZA" dirty="0" smtClean="0"/>
-              <a:t> </a:t>
-            </a:r>
-            <a:r>
-              <a:rPr lang="en-ZA" dirty="0" smtClean="0"/>
-              <a:t> </a:t>
-            </a:r>
-            <a:r>
-              <a:rPr lang="en-ZA" dirty="0"/>
-              <a:t>one </a:t>
-            </a:r>
-            <a:r>
-              <a:rPr lang="en-ZA" dirty="0" smtClean="0"/>
-              <a:t>object have </a:t>
-            </a:r>
-            <a:r>
-              <a:rPr lang="en-ZA" dirty="0"/>
-              <a:t>many forms. Polymorphism manifests itself by having multiple methods all with the same name, but slightly different functionality.</a:t>
-            </a:r>
-            <a:endParaRPr lang="en-ZA" dirty="0" smtClean="0"/>
-          </a:p>
-        </p:txBody>
-      </p:sp>
-    </p:spTree>
-    <p:extLst>
-      <p:ext uri="{BB962C8B-B14F-4D97-AF65-F5344CB8AC3E}">
-        <p14:creationId xmlns:p14="http://schemas.microsoft.com/office/powerpoint/2010/main" val="2902649148"/>
-      </p:ext>
-    </p:extLst>
-  </p:cSld>
-  <p:clrMapOvr>
-    <a:masterClrMapping/>
-  </p:clrMapOvr>
-</p:sld>
-</file>
-
-<file path=ppt/slides/slide30.xml><?xml version="1.0" encoding="utf-8"?>
+<file path=ppt/slides/slide32.xml><?xml version="1.0" encoding="utf-8"?>
 <p:sld xmlns:a="http://schemas.openxmlformats.org/drawingml/2006/main" xmlns:r="http://schemas.openxmlformats.org/officeDocument/2006/relationships" xmlns:p="http://schemas.openxmlformats.org/presentationml/2006/main">
   <p:cSld>
     <p:spTree>
@@ -5547,7 +5719,7 @@
 </p:sld>
 </file>
 
-<file path=ppt/slides/slide31.xml><?xml version="1.0" encoding="utf-8"?>
+<file path=ppt/slides/slide33.xml><?xml version="1.0" encoding="utf-8"?>
 <p:sld xmlns:a="http://schemas.openxmlformats.org/drawingml/2006/main" xmlns:r="http://schemas.openxmlformats.org/officeDocument/2006/relationships" xmlns:p="http://schemas.openxmlformats.org/presentationml/2006/main">
   <p:cSld>
     <p:spTree>
@@ -5641,7 +5813,7 @@
 </p:sld>
 </file>
 
-<file path=ppt/slides/slide32.xml><?xml version="1.0" encoding="utf-8"?>
+<file path=ppt/slides/slide34.xml><?xml version="1.0" encoding="utf-8"?>
 <p:sld xmlns:a="http://schemas.openxmlformats.org/drawingml/2006/main" xmlns:r="http://schemas.openxmlformats.org/officeDocument/2006/relationships" xmlns:p="http://schemas.openxmlformats.org/presentationml/2006/main">
   <p:cSld>
     <p:spTree>
@@ -5735,7 +5907,7 @@
 </p:sld>
 </file>
 
-<file path=ppt/slides/slide33.xml><?xml version="1.0" encoding="utf-8"?>
+<file path=ppt/slides/slide35.xml><?xml version="1.0" encoding="utf-8"?>
 <p:sld xmlns:a="http://schemas.openxmlformats.org/drawingml/2006/main" xmlns:r="http://schemas.openxmlformats.org/officeDocument/2006/relationships" xmlns:p="http://schemas.openxmlformats.org/presentationml/2006/main">
   <p:cSld>
     <p:spTree>
@@ -5829,7 +6001,7 @@
 </p:sld>
 </file>
 
-<file path=ppt/slides/slide34.xml><?xml version="1.0" encoding="utf-8"?>
+<file path=ppt/slides/slide36.xml><?xml version="1.0" encoding="utf-8"?>
 <p:sld xmlns:a="http://schemas.openxmlformats.org/drawingml/2006/main" xmlns:r="http://schemas.openxmlformats.org/officeDocument/2006/relationships" xmlns:p="http://schemas.openxmlformats.org/presentationml/2006/main">
   <p:cSld>
     <p:spTree>
@@ -6268,11 +6440,7 @@
           <a:p>
             <a:r>
               <a:rPr lang="en-ZA" dirty="0" smtClean="0"/>
-              <a:t>Sequence </a:t>
-            </a:r>
-            <a:r>
-              <a:rPr lang="en-ZA" dirty="0" smtClean="0"/>
-              <a:t>diagram snippet</a:t>
+              <a:t>Sequence diagram snippet</a:t>
             </a:r>
             <a:endParaRPr lang="en-ZA" dirty="0"/>
           </a:p>
@@ -6384,11 +6552,7 @@
           <a:p>
             <a:r>
               <a:rPr lang="en-ZA" dirty="0" smtClean="0"/>
-              <a:t>Architecture </a:t>
-            </a:r>
-            <a:r>
-              <a:rPr lang="en-ZA" dirty="0" smtClean="0"/>
-              <a:t>Diagram</a:t>
+              <a:t>Architecture Diagram</a:t>
             </a:r>
             <a:endParaRPr lang="en-ZA" dirty="0"/>
           </a:p>

</xml_diff>

<commit_message>
added fanmail and travel bank
</commit_message>
<xml_diff>
--- a/chaluutali Documentation.pptx
+++ b/chaluutali Documentation.pptx
@@ -41,6 +41,8 @@
     <p:sldId id="295" r:id="rId35"/>
     <p:sldId id="296" r:id="rId36"/>
     <p:sldId id="304" r:id="rId37"/>
+    <p:sldId id="307" r:id="rId38"/>
+    <p:sldId id="308" r:id="rId39"/>
   </p:sldIdLst>
   <p:sldSz cx="9144000" cy="6858000" type="screen4x3"/>
   <p:notesSz cx="6858000" cy="9144000"/>
@@ -324,7 +326,7 @@
             <a:fld id="{1D8BD707-D9CF-40AE-B4C6-C98DA3205C09}" type="datetimeFigureOut">
               <a:rPr lang="en-US" smtClean="0"/>
               <a:pPr/>
-              <a:t>6/4/2018</a:t>
+              <a:t>6/8/2018</a:t>
             </a:fld>
             <a:endParaRPr lang="en-US"/>
           </a:p>
@@ -496,7 +498,7 @@
             <a:fld id="{1D8BD707-D9CF-40AE-B4C6-C98DA3205C09}" type="datetimeFigureOut">
               <a:rPr lang="en-US" smtClean="0"/>
               <a:pPr/>
-              <a:t>6/4/2018</a:t>
+              <a:t>6/8/2018</a:t>
             </a:fld>
             <a:endParaRPr lang="en-US"/>
           </a:p>
@@ -678,7 +680,7 @@
             <a:fld id="{1D8BD707-D9CF-40AE-B4C6-C98DA3205C09}" type="datetimeFigureOut">
               <a:rPr lang="en-US" smtClean="0"/>
               <a:pPr/>
-              <a:t>6/4/2018</a:t>
+              <a:t>6/8/2018</a:t>
             </a:fld>
             <a:endParaRPr lang="en-US"/>
           </a:p>
@@ -850,7 +852,7 @@
             <a:fld id="{1D8BD707-D9CF-40AE-B4C6-C98DA3205C09}" type="datetimeFigureOut">
               <a:rPr lang="en-US" smtClean="0"/>
               <a:pPr/>
-              <a:t>6/4/2018</a:t>
+              <a:t>6/8/2018</a:t>
             </a:fld>
             <a:endParaRPr lang="en-US"/>
           </a:p>
@@ -1098,7 +1100,7 @@
             <a:fld id="{1D8BD707-D9CF-40AE-B4C6-C98DA3205C09}" type="datetimeFigureOut">
               <a:rPr lang="en-US" smtClean="0"/>
               <a:pPr/>
-              <a:t>6/4/2018</a:t>
+              <a:t>6/8/2018</a:t>
             </a:fld>
             <a:endParaRPr lang="en-US"/>
           </a:p>
@@ -1388,7 +1390,7 @@
             <a:fld id="{1D8BD707-D9CF-40AE-B4C6-C98DA3205C09}" type="datetimeFigureOut">
               <a:rPr lang="en-US" smtClean="0"/>
               <a:pPr/>
-              <a:t>6/4/2018</a:t>
+              <a:t>6/8/2018</a:t>
             </a:fld>
             <a:endParaRPr lang="en-US"/>
           </a:p>
@@ -1812,7 +1814,7 @@
             <a:fld id="{1D8BD707-D9CF-40AE-B4C6-C98DA3205C09}" type="datetimeFigureOut">
               <a:rPr lang="en-US" smtClean="0"/>
               <a:pPr/>
-              <a:t>6/4/2018</a:t>
+              <a:t>6/8/2018</a:t>
             </a:fld>
             <a:endParaRPr lang="en-US"/>
           </a:p>
@@ -1932,7 +1934,7 @@
             <a:fld id="{1D8BD707-D9CF-40AE-B4C6-C98DA3205C09}" type="datetimeFigureOut">
               <a:rPr lang="en-US" smtClean="0"/>
               <a:pPr/>
-              <a:t>6/4/2018</a:t>
+              <a:t>6/8/2018</a:t>
             </a:fld>
             <a:endParaRPr lang="en-US"/>
           </a:p>
@@ -2029,7 +2031,7 @@
             <a:fld id="{1D8BD707-D9CF-40AE-B4C6-C98DA3205C09}" type="datetimeFigureOut">
               <a:rPr lang="en-US" smtClean="0"/>
               <a:pPr/>
-              <a:t>6/4/2018</a:t>
+              <a:t>6/8/2018</a:t>
             </a:fld>
             <a:endParaRPr lang="en-US"/>
           </a:p>
@@ -2308,7 +2310,7 @@
             <a:fld id="{1D8BD707-D9CF-40AE-B4C6-C98DA3205C09}" type="datetimeFigureOut">
               <a:rPr lang="en-US" smtClean="0"/>
               <a:pPr/>
-              <a:t>6/4/2018</a:t>
+              <a:t>6/8/2018</a:t>
             </a:fld>
             <a:endParaRPr lang="en-US"/>
           </a:p>
@@ -2563,7 +2565,7 @@
             <a:fld id="{1D8BD707-D9CF-40AE-B4C6-C98DA3205C09}" type="datetimeFigureOut">
               <a:rPr lang="en-US" smtClean="0"/>
               <a:pPr/>
-              <a:t>6/4/2018</a:t>
+              <a:t>6/8/2018</a:t>
             </a:fld>
             <a:endParaRPr lang="en-US"/>
           </a:p>
@@ -2778,7 +2780,7 @@
             <a:fld id="{1D8BD707-D9CF-40AE-B4C6-C98DA3205C09}" type="datetimeFigureOut">
               <a:rPr lang="en-US" smtClean="0"/>
               <a:pPr/>
-              <a:t>6/4/2018</a:t>
+              <a:t>6/8/2018</a:t>
             </a:fld>
             <a:endParaRPr lang="en-US"/>
           </a:p>
@@ -6086,6 +6088,274 @@
     <p:extLst>
       <p:ext uri="{BB962C8B-B14F-4D97-AF65-F5344CB8AC3E}">
         <p14:creationId xmlns:p14="http://schemas.microsoft.com/office/powerpoint/2010/main" val="4202146331"/>
+      </p:ext>
+    </p:extLst>
+  </p:cSld>
+  <p:clrMapOvr>
+    <a:masterClrMapping/>
+  </p:clrMapOvr>
+</p:sld>
+</file>
+
+<file path=ppt/slides/slide37.xml><?xml version="1.0" encoding="utf-8"?>
+<p:sld xmlns:a="http://schemas.openxmlformats.org/drawingml/2006/main" xmlns:r="http://schemas.openxmlformats.org/officeDocument/2006/relationships" xmlns:p="http://schemas.openxmlformats.org/presentationml/2006/main">
+  <p:cSld>
+    <p:spTree>
+      <p:nvGrpSpPr>
+        <p:cNvPr id="1" name=""/>
+        <p:cNvGrpSpPr/>
+        <p:nvPr/>
+      </p:nvGrpSpPr>
+      <p:grpSpPr>
+        <a:xfrm>
+          <a:off x="0" y="0"/>
+          <a:ext cx="0" cy="0"/>
+          <a:chOff x="0" y="0"/>
+          <a:chExt cx="0" cy="0"/>
+        </a:xfrm>
+      </p:grpSpPr>
+      <p:sp>
+        <p:nvSpPr>
+          <p:cNvPr id="2" name="Title 1"/>
+          <p:cNvSpPr>
+            <a:spLocks noGrp="1"/>
+          </p:cNvSpPr>
+          <p:nvPr>
+            <p:ph type="title"/>
+          </p:nvPr>
+        </p:nvSpPr>
+        <p:spPr/>
+        <p:txBody>
+          <a:bodyPr/>
+          <a:lstStyle/>
+          <a:p>
+            <a:endParaRPr lang="en-ZA"/>
+          </a:p>
+        </p:txBody>
+      </p:sp>
+      <p:sp>
+        <p:nvSpPr>
+          <p:cNvPr id="3" name="Picture Placeholder 2"/>
+          <p:cNvSpPr>
+            <a:spLocks noGrp="1"/>
+          </p:cNvSpPr>
+          <p:nvPr>
+            <p:ph type="pic" idx="1"/>
+          </p:nvPr>
+        </p:nvSpPr>
+        <p:spPr/>
+      </p:sp>
+      <p:sp>
+        <p:nvSpPr>
+          <p:cNvPr id="4" name="Text Placeholder 3"/>
+          <p:cNvSpPr>
+            <a:spLocks noGrp="1"/>
+          </p:cNvSpPr>
+          <p:nvPr>
+            <p:ph type="body" sz="half" idx="2"/>
+          </p:nvPr>
+        </p:nvSpPr>
+        <p:spPr/>
+        <p:txBody>
+          <a:bodyPr/>
+          <a:lstStyle/>
+          <a:p>
+            <a:endParaRPr lang="en-ZA"/>
+          </a:p>
+        </p:txBody>
+      </p:sp>
+      <p:pic>
+        <p:nvPicPr>
+          <p:cNvPr id="1026" name="Picture 2"/>
+          <p:cNvPicPr>
+            <a:picLocks noChangeAspect="1" noChangeArrowheads="1"/>
+          </p:cNvPicPr>
+          <p:nvPr/>
+        </p:nvPicPr>
+        <p:blipFill>
+          <a:blip r:embed="rId2">
+            <a:extLst>
+              <a:ext uri="{28A0092B-C50C-407E-A947-70E740481C1C}">
+                <a14:useLocalDpi xmlns:a14="http://schemas.microsoft.com/office/drawing/2010/main" val="0"/>
+              </a:ext>
+            </a:extLst>
+          </a:blip>
+          <a:srcRect/>
+          <a:stretch>
+            <a:fillRect/>
+          </a:stretch>
+        </p:blipFill>
+        <p:spPr bwMode="auto">
+          <a:xfrm>
+            <a:off x="0" y="0"/>
+            <a:ext cx="15240000" cy="7581900"/>
+          </a:xfrm>
+          <a:prstGeom prst="rect">
+            <a:avLst/>
+          </a:prstGeom>
+          <a:noFill/>
+          <a:ln>
+            <a:noFill/>
+          </a:ln>
+          <a:extLst>
+            <a:ext uri="{909E8E84-426E-40DD-AFC4-6F175D3DCCD1}">
+              <a14:hiddenFill xmlns:a14="http://schemas.microsoft.com/office/drawing/2010/main">
+                <a:solidFill>
+                  <a:schemeClr val="accent1"/>
+                </a:solidFill>
+              </a14:hiddenFill>
+            </a:ext>
+            <a:ext uri="{91240B29-F687-4F45-9708-019B960494DF}">
+              <a14:hiddenLine xmlns:a14="http://schemas.microsoft.com/office/drawing/2010/main" w="9525">
+                <a:solidFill>
+                  <a:schemeClr val="tx1"/>
+                </a:solidFill>
+                <a:miter lim="800000"/>
+                <a:headEnd/>
+                <a:tailEnd/>
+              </a14:hiddenLine>
+            </a:ext>
+          </a:extLst>
+        </p:spPr>
+      </p:pic>
+    </p:spTree>
+    <p:extLst>
+      <p:ext uri="{BB962C8B-B14F-4D97-AF65-F5344CB8AC3E}">
+        <p14:creationId xmlns:p14="http://schemas.microsoft.com/office/powerpoint/2010/main" val="124202776"/>
+      </p:ext>
+    </p:extLst>
+  </p:cSld>
+  <p:clrMapOvr>
+    <a:masterClrMapping/>
+  </p:clrMapOvr>
+</p:sld>
+</file>
+
+<file path=ppt/slides/slide38.xml><?xml version="1.0" encoding="utf-8"?>
+<p:sld xmlns:a="http://schemas.openxmlformats.org/drawingml/2006/main" xmlns:r="http://schemas.openxmlformats.org/officeDocument/2006/relationships" xmlns:p="http://schemas.openxmlformats.org/presentationml/2006/main">
+  <p:cSld>
+    <p:spTree>
+      <p:nvGrpSpPr>
+        <p:cNvPr id="1" name=""/>
+        <p:cNvGrpSpPr/>
+        <p:nvPr/>
+      </p:nvGrpSpPr>
+      <p:grpSpPr>
+        <a:xfrm>
+          <a:off x="0" y="0"/>
+          <a:ext cx="0" cy="0"/>
+          <a:chOff x="0" y="0"/>
+          <a:chExt cx="0" cy="0"/>
+        </a:xfrm>
+      </p:grpSpPr>
+      <p:sp>
+        <p:nvSpPr>
+          <p:cNvPr id="2" name="Title 1"/>
+          <p:cNvSpPr>
+            <a:spLocks noGrp="1"/>
+          </p:cNvSpPr>
+          <p:nvPr>
+            <p:ph type="title"/>
+          </p:nvPr>
+        </p:nvSpPr>
+        <p:spPr/>
+        <p:txBody>
+          <a:bodyPr/>
+          <a:lstStyle/>
+          <a:p>
+            <a:endParaRPr lang="en-ZA"/>
+          </a:p>
+        </p:txBody>
+      </p:sp>
+      <p:sp>
+        <p:nvSpPr>
+          <p:cNvPr id="3" name="Picture Placeholder 2"/>
+          <p:cNvSpPr>
+            <a:spLocks noGrp="1"/>
+          </p:cNvSpPr>
+          <p:nvPr>
+            <p:ph type="pic" idx="1"/>
+          </p:nvPr>
+        </p:nvSpPr>
+        <p:spPr/>
+      </p:sp>
+      <p:sp>
+        <p:nvSpPr>
+          <p:cNvPr id="4" name="Text Placeholder 3"/>
+          <p:cNvSpPr>
+            <a:spLocks noGrp="1"/>
+          </p:cNvSpPr>
+          <p:nvPr>
+            <p:ph type="body" sz="half" idx="2"/>
+          </p:nvPr>
+        </p:nvSpPr>
+        <p:spPr/>
+        <p:txBody>
+          <a:bodyPr/>
+          <a:lstStyle/>
+          <a:p>
+            <a:endParaRPr lang="en-ZA"/>
+          </a:p>
+        </p:txBody>
+      </p:sp>
+      <p:pic>
+        <p:nvPicPr>
+          <p:cNvPr id="2050" name="Picture 2"/>
+          <p:cNvPicPr>
+            <a:picLocks noChangeAspect="1" noChangeArrowheads="1"/>
+          </p:cNvPicPr>
+          <p:nvPr/>
+        </p:nvPicPr>
+        <p:blipFill>
+          <a:blip r:embed="rId2">
+            <a:extLst>
+              <a:ext uri="{28A0092B-C50C-407E-A947-70E740481C1C}">
+                <a14:useLocalDpi xmlns:a14="http://schemas.microsoft.com/office/drawing/2010/main" val="0"/>
+              </a:ext>
+            </a:extLst>
+          </a:blip>
+          <a:srcRect/>
+          <a:stretch>
+            <a:fillRect/>
+          </a:stretch>
+        </p:blipFill>
+        <p:spPr bwMode="auto">
+          <a:xfrm>
+            <a:off x="0" y="0"/>
+            <a:ext cx="15240000" cy="7600950"/>
+          </a:xfrm>
+          <a:prstGeom prst="rect">
+            <a:avLst/>
+          </a:prstGeom>
+          <a:noFill/>
+          <a:ln>
+            <a:noFill/>
+          </a:ln>
+          <a:extLst>
+            <a:ext uri="{909E8E84-426E-40DD-AFC4-6F175D3DCCD1}">
+              <a14:hiddenFill xmlns:a14="http://schemas.microsoft.com/office/drawing/2010/main">
+                <a:solidFill>
+                  <a:schemeClr val="accent1"/>
+                </a:solidFill>
+              </a14:hiddenFill>
+            </a:ext>
+            <a:ext uri="{91240B29-F687-4F45-9708-019B960494DF}">
+              <a14:hiddenLine xmlns:a14="http://schemas.microsoft.com/office/drawing/2010/main" w="9525">
+                <a:solidFill>
+                  <a:schemeClr val="tx1"/>
+                </a:solidFill>
+                <a:miter lim="800000"/>
+                <a:headEnd/>
+                <a:tailEnd/>
+              </a14:hiddenLine>
+            </a:ext>
+          </a:extLst>
+        </p:spPr>
+      </p:pic>
+    </p:spTree>
+    <p:extLst>
+      <p:ext uri="{BB962C8B-B14F-4D97-AF65-F5344CB8AC3E}">
+        <p14:creationId xmlns:p14="http://schemas.microsoft.com/office/powerpoint/2010/main" val="2464043082"/>
       </p:ext>
     </p:extLst>
   </p:cSld>

</xml_diff>

<commit_message>
mail can be received
</commit_message>
<xml_diff>
--- a/chaluutali Documentation.pptx
+++ b/chaluutali Documentation.pptx
@@ -43,6 +43,8 @@
     <p:sldId id="304" r:id="rId37"/>
     <p:sldId id="307" r:id="rId38"/>
     <p:sldId id="308" r:id="rId39"/>
+    <p:sldId id="309" r:id="rId40"/>
+    <p:sldId id="310" r:id="rId41"/>
   </p:sldIdLst>
   <p:sldSz cx="9144000" cy="6858000" type="screen4x3"/>
   <p:notesSz cx="6858000" cy="9144000"/>
@@ -326,7 +328,7 @@
             <a:fld id="{1D8BD707-D9CF-40AE-B4C6-C98DA3205C09}" type="datetimeFigureOut">
               <a:rPr lang="en-US" smtClean="0"/>
               <a:pPr/>
-              <a:t>6/8/2018</a:t>
+              <a:t>6/11/2018</a:t>
             </a:fld>
             <a:endParaRPr lang="en-US"/>
           </a:p>
@@ -498,7 +500,7 @@
             <a:fld id="{1D8BD707-D9CF-40AE-B4C6-C98DA3205C09}" type="datetimeFigureOut">
               <a:rPr lang="en-US" smtClean="0"/>
               <a:pPr/>
-              <a:t>6/8/2018</a:t>
+              <a:t>6/11/2018</a:t>
             </a:fld>
             <a:endParaRPr lang="en-US"/>
           </a:p>
@@ -680,7 +682,7 @@
             <a:fld id="{1D8BD707-D9CF-40AE-B4C6-C98DA3205C09}" type="datetimeFigureOut">
               <a:rPr lang="en-US" smtClean="0"/>
               <a:pPr/>
-              <a:t>6/8/2018</a:t>
+              <a:t>6/11/2018</a:t>
             </a:fld>
             <a:endParaRPr lang="en-US"/>
           </a:p>
@@ -852,7 +854,7 @@
             <a:fld id="{1D8BD707-D9CF-40AE-B4C6-C98DA3205C09}" type="datetimeFigureOut">
               <a:rPr lang="en-US" smtClean="0"/>
               <a:pPr/>
-              <a:t>6/8/2018</a:t>
+              <a:t>6/11/2018</a:t>
             </a:fld>
             <a:endParaRPr lang="en-US"/>
           </a:p>
@@ -1100,7 +1102,7 @@
             <a:fld id="{1D8BD707-D9CF-40AE-B4C6-C98DA3205C09}" type="datetimeFigureOut">
               <a:rPr lang="en-US" smtClean="0"/>
               <a:pPr/>
-              <a:t>6/8/2018</a:t>
+              <a:t>6/11/2018</a:t>
             </a:fld>
             <a:endParaRPr lang="en-US"/>
           </a:p>
@@ -1390,7 +1392,7 @@
             <a:fld id="{1D8BD707-D9CF-40AE-B4C6-C98DA3205C09}" type="datetimeFigureOut">
               <a:rPr lang="en-US" smtClean="0"/>
               <a:pPr/>
-              <a:t>6/8/2018</a:t>
+              <a:t>6/11/2018</a:t>
             </a:fld>
             <a:endParaRPr lang="en-US"/>
           </a:p>
@@ -1814,7 +1816,7 @@
             <a:fld id="{1D8BD707-D9CF-40AE-B4C6-C98DA3205C09}" type="datetimeFigureOut">
               <a:rPr lang="en-US" smtClean="0"/>
               <a:pPr/>
-              <a:t>6/8/2018</a:t>
+              <a:t>6/11/2018</a:t>
             </a:fld>
             <a:endParaRPr lang="en-US"/>
           </a:p>
@@ -1934,7 +1936,7 @@
             <a:fld id="{1D8BD707-D9CF-40AE-B4C6-C98DA3205C09}" type="datetimeFigureOut">
               <a:rPr lang="en-US" smtClean="0"/>
               <a:pPr/>
-              <a:t>6/8/2018</a:t>
+              <a:t>6/11/2018</a:t>
             </a:fld>
             <a:endParaRPr lang="en-US"/>
           </a:p>
@@ -2031,7 +2033,7 @@
             <a:fld id="{1D8BD707-D9CF-40AE-B4C6-C98DA3205C09}" type="datetimeFigureOut">
               <a:rPr lang="en-US" smtClean="0"/>
               <a:pPr/>
-              <a:t>6/8/2018</a:t>
+              <a:t>6/11/2018</a:t>
             </a:fld>
             <a:endParaRPr lang="en-US"/>
           </a:p>
@@ -2310,7 +2312,7 @@
             <a:fld id="{1D8BD707-D9CF-40AE-B4C6-C98DA3205C09}" type="datetimeFigureOut">
               <a:rPr lang="en-US" smtClean="0"/>
               <a:pPr/>
-              <a:t>6/8/2018</a:t>
+              <a:t>6/11/2018</a:t>
             </a:fld>
             <a:endParaRPr lang="en-US"/>
           </a:p>
@@ -2565,7 +2567,7 @@
             <a:fld id="{1D8BD707-D9CF-40AE-B4C6-C98DA3205C09}" type="datetimeFigureOut">
               <a:rPr lang="en-US" smtClean="0"/>
               <a:pPr/>
-              <a:t>6/8/2018</a:t>
+              <a:t>6/11/2018</a:t>
             </a:fld>
             <a:endParaRPr lang="en-US"/>
           </a:p>
@@ -2780,7 +2782,7 @@
             <a:fld id="{1D8BD707-D9CF-40AE-B4C6-C98DA3205C09}" type="datetimeFigureOut">
               <a:rPr lang="en-US" smtClean="0"/>
               <a:pPr/>
-              <a:t>6/8/2018</a:t>
+              <a:t>6/11/2018</a:t>
             </a:fld>
             <a:endParaRPr lang="en-US"/>
           </a:p>
@@ -6365,6 +6367,140 @@
 </p:sld>
 </file>
 
+<file path=ppt/slides/slide39.xml><?xml version="1.0" encoding="utf-8"?>
+<p:sld xmlns:a="http://schemas.openxmlformats.org/drawingml/2006/main" xmlns:r="http://schemas.openxmlformats.org/officeDocument/2006/relationships" xmlns:p="http://schemas.openxmlformats.org/presentationml/2006/main">
+  <p:cSld>
+    <p:spTree>
+      <p:nvGrpSpPr>
+        <p:cNvPr id="1" name=""/>
+        <p:cNvGrpSpPr/>
+        <p:nvPr/>
+      </p:nvGrpSpPr>
+      <p:grpSpPr>
+        <a:xfrm>
+          <a:off x="0" y="0"/>
+          <a:ext cx="0" cy="0"/>
+          <a:chOff x="0" y="0"/>
+          <a:chExt cx="0" cy="0"/>
+        </a:xfrm>
+      </p:grpSpPr>
+      <p:sp>
+        <p:nvSpPr>
+          <p:cNvPr id="2" name="Title 1"/>
+          <p:cNvSpPr>
+            <a:spLocks noGrp="1"/>
+          </p:cNvSpPr>
+          <p:nvPr>
+            <p:ph type="title"/>
+          </p:nvPr>
+        </p:nvSpPr>
+        <p:spPr/>
+        <p:txBody>
+          <a:bodyPr/>
+          <a:lstStyle/>
+          <a:p>
+            <a:endParaRPr lang="en-ZA"/>
+          </a:p>
+        </p:txBody>
+      </p:sp>
+      <p:sp>
+        <p:nvSpPr>
+          <p:cNvPr id="3" name="Picture Placeholder 2"/>
+          <p:cNvSpPr>
+            <a:spLocks noGrp="1"/>
+          </p:cNvSpPr>
+          <p:nvPr>
+            <p:ph type="pic" idx="1"/>
+          </p:nvPr>
+        </p:nvSpPr>
+        <p:spPr/>
+      </p:sp>
+      <p:sp>
+        <p:nvSpPr>
+          <p:cNvPr id="4" name="Text Placeholder 3"/>
+          <p:cNvSpPr>
+            <a:spLocks noGrp="1"/>
+          </p:cNvSpPr>
+          <p:nvPr>
+            <p:ph type="body" sz="half" idx="2"/>
+          </p:nvPr>
+        </p:nvSpPr>
+        <p:spPr/>
+        <p:txBody>
+          <a:bodyPr/>
+          <a:lstStyle/>
+          <a:p>
+            <a:endParaRPr lang="en-ZA"/>
+          </a:p>
+        </p:txBody>
+      </p:sp>
+      <p:pic>
+        <p:nvPicPr>
+          <p:cNvPr id="1026" name="Picture 2"/>
+          <p:cNvPicPr>
+            <a:picLocks noChangeAspect="1" noChangeArrowheads="1"/>
+          </p:cNvPicPr>
+          <p:nvPr/>
+        </p:nvPicPr>
+        <p:blipFill>
+          <a:blip r:embed="rId2">
+            <a:extLst>
+              <a:ext uri="{28A0092B-C50C-407E-A947-70E740481C1C}">
+                <a14:useLocalDpi xmlns:a14="http://schemas.microsoft.com/office/drawing/2010/main" val="0"/>
+              </a:ext>
+            </a:extLst>
+          </a:blip>
+          <a:srcRect/>
+          <a:stretch>
+            <a:fillRect/>
+          </a:stretch>
+        </p:blipFill>
+        <p:spPr bwMode="auto">
+          <a:xfrm>
+            <a:off x="0" y="0"/>
+            <a:ext cx="15220950" cy="7924800"/>
+          </a:xfrm>
+          <a:prstGeom prst="rect">
+            <a:avLst/>
+          </a:prstGeom>
+          <a:noFill/>
+          <a:ln>
+            <a:noFill/>
+          </a:ln>
+          <a:extLst>
+            <a:ext uri="{909E8E84-426E-40DD-AFC4-6F175D3DCCD1}">
+              <a14:hiddenFill xmlns:a14="http://schemas.microsoft.com/office/drawing/2010/main">
+                <a:solidFill>
+                  <a:schemeClr val="accent1"/>
+                </a:solidFill>
+              </a14:hiddenFill>
+            </a:ext>
+            <a:ext uri="{91240B29-F687-4F45-9708-019B960494DF}">
+              <a14:hiddenLine xmlns:a14="http://schemas.microsoft.com/office/drawing/2010/main" w="9525">
+                <a:solidFill>
+                  <a:schemeClr val="tx1"/>
+                </a:solidFill>
+                <a:miter lim="800000"/>
+                <a:headEnd/>
+                <a:tailEnd/>
+              </a14:hiddenLine>
+            </a:ext>
+          </a:extLst>
+        </p:spPr>
+      </p:pic>
+    </p:spTree>
+    <p:extLst>
+      <p:ext uri="{BB962C8B-B14F-4D97-AF65-F5344CB8AC3E}">
+        <p14:creationId xmlns:p14="http://schemas.microsoft.com/office/powerpoint/2010/main" val="2012061102"/>
+      </p:ext>
+    </p:extLst>
+  </p:cSld>
+  <p:clrMapOvr>
+    <a:masterClrMapping/>
+  </p:clrMapOvr>
+</p:sld>
+</file>
+
 <file path=ppt/slides/slide4.xml><?xml version="1.0" encoding="utf-8"?>
 <p:sld xmlns:a="http://schemas.openxmlformats.org/drawingml/2006/main" xmlns:r="http://schemas.openxmlformats.org/officeDocument/2006/relationships" xmlns:p="http://schemas.openxmlformats.org/presentationml/2006/main">
   <p:cSld>
@@ -6480,6 +6616,140 @@
     <p:extLst>
       <p:ext uri="{BB962C8B-B14F-4D97-AF65-F5344CB8AC3E}">
         <p14:creationId xmlns:p14="http://schemas.microsoft.com/office/powerpoint/2010/main" val="1640058919"/>
+      </p:ext>
+    </p:extLst>
+  </p:cSld>
+  <p:clrMapOvr>
+    <a:masterClrMapping/>
+  </p:clrMapOvr>
+</p:sld>
+</file>
+
+<file path=ppt/slides/slide40.xml><?xml version="1.0" encoding="utf-8"?>
+<p:sld xmlns:a="http://schemas.openxmlformats.org/drawingml/2006/main" xmlns:r="http://schemas.openxmlformats.org/officeDocument/2006/relationships" xmlns:p="http://schemas.openxmlformats.org/presentationml/2006/main">
+  <p:cSld>
+    <p:spTree>
+      <p:nvGrpSpPr>
+        <p:cNvPr id="1" name=""/>
+        <p:cNvGrpSpPr/>
+        <p:nvPr/>
+      </p:nvGrpSpPr>
+      <p:grpSpPr>
+        <a:xfrm>
+          <a:off x="0" y="0"/>
+          <a:ext cx="0" cy="0"/>
+          <a:chOff x="0" y="0"/>
+          <a:chExt cx="0" cy="0"/>
+        </a:xfrm>
+      </p:grpSpPr>
+      <p:sp>
+        <p:nvSpPr>
+          <p:cNvPr id="2" name="Title 1"/>
+          <p:cNvSpPr>
+            <a:spLocks noGrp="1"/>
+          </p:cNvSpPr>
+          <p:nvPr>
+            <p:ph type="title"/>
+          </p:nvPr>
+        </p:nvSpPr>
+        <p:spPr/>
+        <p:txBody>
+          <a:bodyPr/>
+          <a:lstStyle/>
+          <a:p>
+            <a:endParaRPr lang="en-ZA"/>
+          </a:p>
+        </p:txBody>
+      </p:sp>
+      <p:sp>
+        <p:nvSpPr>
+          <p:cNvPr id="3" name="Picture Placeholder 2"/>
+          <p:cNvSpPr>
+            <a:spLocks noGrp="1"/>
+          </p:cNvSpPr>
+          <p:nvPr>
+            <p:ph type="pic" idx="1"/>
+          </p:nvPr>
+        </p:nvSpPr>
+        <p:spPr/>
+      </p:sp>
+      <p:sp>
+        <p:nvSpPr>
+          <p:cNvPr id="4" name="Text Placeholder 3"/>
+          <p:cNvSpPr>
+            <a:spLocks noGrp="1"/>
+          </p:cNvSpPr>
+          <p:nvPr>
+            <p:ph type="body" sz="half" idx="2"/>
+          </p:nvPr>
+        </p:nvSpPr>
+        <p:spPr/>
+        <p:txBody>
+          <a:bodyPr/>
+          <a:lstStyle/>
+          <a:p>
+            <a:endParaRPr lang="en-ZA"/>
+          </a:p>
+        </p:txBody>
+      </p:sp>
+      <p:pic>
+        <p:nvPicPr>
+          <p:cNvPr id="2050" name="Picture 2"/>
+          <p:cNvPicPr>
+            <a:picLocks noChangeAspect="1" noChangeArrowheads="1"/>
+          </p:cNvPicPr>
+          <p:nvPr/>
+        </p:nvPicPr>
+        <p:blipFill>
+          <a:blip r:embed="rId2">
+            <a:extLst>
+              <a:ext uri="{28A0092B-C50C-407E-A947-70E740481C1C}">
+                <a14:useLocalDpi xmlns:a14="http://schemas.microsoft.com/office/drawing/2010/main" val="0"/>
+              </a:ext>
+            </a:extLst>
+          </a:blip>
+          <a:srcRect/>
+          <a:stretch>
+            <a:fillRect/>
+          </a:stretch>
+        </p:blipFill>
+        <p:spPr bwMode="auto">
+          <a:xfrm>
+            <a:off x="0" y="0"/>
+            <a:ext cx="15240000" cy="7943850"/>
+          </a:xfrm>
+          <a:prstGeom prst="rect">
+            <a:avLst/>
+          </a:prstGeom>
+          <a:noFill/>
+          <a:ln>
+            <a:noFill/>
+          </a:ln>
+          <a:extLst>
+            <a:ext uri="{909E8E84-426E-40DD-AFC4-6F175D3DCCD1}">
+              <a14:hiddenFill xmlns:a14="http://schemas.microsoft.com/office/drawing/2010/main">
+                <a:solidFill>
+                  <a:schemeClr val="accent1"/>
+                </a:solidFill>
+              </a14:hiddenFill>
+            </a:ext>
+            <a:ext uri="{91240B29-F687-4F45-9708-019B960494DF}">
+              <a14:hiddenLine xmlns:a14="http://schemas.microsoft.com/office/drawing/2010/main" w="9525">
+                <a:solidFill>
+                  <a:schemeClr val="tx1"/>
+                </a:solidFill>
+                <a:miter lim="800000"/>
+                <a:headEnd/>
+                <a:tailEnd/>
+              </a14:hiddenLine>
+            </a:ext>
+          </a:extLst>
+        </p:spPr>
+      </p:pic>
+    </p:spTree>
+    <p:extLst>
+      <p:ext uri="{BB962C8B-B14F-4D97-AF65-F5344CB8AC3E}">
+        <p14:creationId xmlns:p14="http://schemas.microsoft.com/office/powerpoint/2010/main" val="1737867155"/>
       </p:ext>
     </p:extLst>
   </p:cSld>

</xml_diff>